<commit_message>
updated screenshots /ht aswathy
</commit_message>
<xml_diff>
--- a/files/2014-lecture1-welcome.pptx
+++ b/files/2014-lecture1-welcome.pptx
@@ -9920,7 +9920,9 @@
         </p:nvSpPr>
         <p:spPr/>
         <p:txBody>
-          <a:bodyPr/>
+          <a:bodyPr>
+            <a:normAutofit fontScale="92500" lnSpcReduction="10000"/>
+          </a:bodyPr>
           <a:lstStyle/>
           <a:p>
             <a:pPr marL="0" indent="0" algn="ctr">
@@ -9977,6 +9979,19 @@
             <a:r>
               <a:rPr lang="en-US" dirty="0" smtClean="0"/>
               <a:t>I will post Judi Brown Clark’s contact information on the wall shortly.</a:t>
+            </a:r>
+          </a:p>
+          <a:p>
+            <a:pPr algn="ctr">
+              <a:buNone/>
+            </a:pPr>
+            <a:r>
+              <a:rPr lang="en-US" dirty="0" smtClean="0"/>
+              <a:t>Note: this is not because of known prior </a:t>
+            </a:r>
+            <a:r>
+              <a:rPr lang="en-US" smtClean="0"/>
+              <a:t>problems, ICYW.</a:t>
             </a:r>
             <a:endParaRPr lang="en-US" dirty="0" smtClean="0"/>
           </a:p>
@@ -11758,8 +11773,8 @@
           <a:lstStyle/>
           <a:p>
             <a:r>
-              <a:rPr lang="en-US" dirty="0" smtClean="0"/>
-              <a:t>Communication!</a:t>
+              <a:rPr lang="en-US" smtClean="0"/>
+              <a:t>Process and materials!</a:t>
             </a:r>
             <a:endParaRPr lang="en-US" dirty="0"/>
           </a:p>

</xml_diff>